<commit_message>
ffmpeg recieve code add
</commit_message>
<xml_diff>
--- a/Process/졸업작품 진행상황(09.12).pptx
+++ b/Process/졸업작품 진행상황(09.12).pptx
@@ -202,7 +202,7 @@
           <a:p>
             <a:fld id="{C61A4759-7F38-4171-9379-E9919B3D4AB5}" type="datetimeFigureOut">
               <a:rPr lang="ko-KR" altLang="en-US" smtClean="0"/>
-              <a:t>2024-09-12</a:t>
+              <a:t>2024-09-13</a:t>
             </a:fld>
             <a:endParaRPr lang="ko-KR" altLang="en-US"/>
           </a:p>
@@ -700,7 +700,7 @@
           <a:p>
             <a:fld id="{E2943F92-62F6-46DA-9399-EAA06BCCF22F}" type="datetimeFigureOut">
               <a:rPr lang="ko-KR" altLang="en-US" smtClean="0"/>
-              <a:t>2024-09-12</a:t>
+              <a:t>2024-09-13</a:t>
             </a:fld>
             <a:endParaRPr lang="ko-KR" altLang="en-US"/>
           </a:p>
@@ -898,7 +898,7 @@
           <a:p>
             <a:fld id="{E2943F92-62F6-46DA-9399-EAA06BCCF22F}" type="datetimeFigureOut">
               <a:rPr lang="ko-KR" altLang="en-US" smtClean="0"/>
-              <a:t>2024-09-12</a:t>
+              <a:t>2024-09-13</a:t>
             </a:fld>
             <a:endParaRPr lang="ko-KR" altLang="en-US"/>
           </a:p>
@@ -1106,7 +1106,7 @@
           <a:p>
             <a:fld id="{E2943F92-62F6-46DA-9399-EAA06BCCF22F}" type="datetimeFigureOut">
               <a:rPr lang="ko-KR" altLang="en-US" smtClean="0"/>
-              <a:t>2024-09-12</a:t>
+              <a:t>2024-09-13</a:t>
             </a:fld>
             <a:endParaRPr lang="ko-KR" altLang="en-US"/>
           </a:p>
@@ -1304,7 +1304,7 @@
           <a:p>
             <a:fld id="{E2943F92-62F6-46DA-9399-EAA06BCCF22F}" type="datetimeFigureOut">
               <a:rPr lang="ko-KR" altLang="en-US" smtClean="0"/>
-              <a:t>2024-09-12</a:t>
+              <a:t>2024-09-13</a:t>
             </a:fld>
             <a:endParaRPr lang="ko-KR" altLang="en-US"/>
           </a:p>
@@ -1579,7 +1579,7 @@
           <a:p>
             <a:fld id="{E2943F92-62F6-46DA-9399-EAA06BCCF22F}" type="datetimeFigureOut">
               <a:rPr lang="ko-KR" altLang="en-US" smtClean="0"/>
-              <a:t>2024-09-12</a:t>
+              <a:t>2024-09-13</a:t>
             </a:fld>
             <a:endParaRPr lang="ko-KR" altLang="en-US"/>
           </a:p>
@@ -1844,7 +1844,7 @@
           <a:p>
             <a:fld id="{E2943F92-62F6-46DA-9399-EAA06BCCF22F}" type="datetimeFigureOut">
               <a:rPr lang="ko-KR" altLang="en-US" smtClean="0"/>
-              <a:t>2024-09-12</a:t>
+              <a:t>2024-09-13</a:t>
             </a:fld>
             <a:endParaRPr lang="ko-KR" altLang="en-US"/>
           </a:p>
@@ -2256,7 +2256,7 @@
           <a:p>
             <a:fld id="{E2943F92-62F6-46DA-9399-EAA06BCCF22F}" type="datetimeFigureOut">
               <a:rPr lang="ko-KR" altLang="en-US" smtClean="0"/>
-              <a:t>2024-09-12</a:t>
+              <a:t>2024-09-13</a:t>
             </a:fld>
             <a:endParaRPr lang="ko-KR" altLang="en-US"/>
           </a:p>
@@ -2397,7 +2397,7 @@
           <a:p>
             <a:fld id="{E2943F92-62F6-46DA-9399-EAA06BCCF22F}" type="datetimeFigureOut">
               <a:rPr lang="ko-KR" altLang="en-US" smtClean="0"/>
-              <a:t>2024-09-12</a:t>
+              <a:t>2024-09-13</a:t>
             </a:fld>
             <a:endParaRPr lang="ko-KR" altLang="en-US"/>
           </a:p>
@@ -2510,7 +2510,7 @@
           <a:p>
             <a:fld id="{E2943F92-62F6-46DA-9399-EAA06BCCF22F}" type="datetimeFigureOut">
               <a:rPr lang="ko-KR" altLang="en-US" smtClean="0"/>
-              <a:t>2024-09-12</a:t>
+              <a:t>2024-09-13</a:t>
             </a:fld>
             <a:endParaRPr lang="ko-KR" altLang="en-US"/>
           </a:p>
@@ -2821,7 +2821,7 @@
           <a:p>
             <a:fld id="{E2943F92-62F6-46DA-9399-EAA06BCCF22F}" type="datetimeFigureOut">
               <a:rPr lang="ko-KR" altLang="en-US" smtClean="0"/>
-              <a:t>2024-09-12</a:t>
+              <a:t>2024-09-13</a:t>
             </a:fld>
             <a:endParaRPr lang="ko-KR" altLang="en-US"/>
           </a:p>
@@ -3109,7 +3109,7 @@
           <a:p>
             <a:fld id="{E2943F92-62F6-46DA-9399-EAA06BCCF22F}" type="datetimeFigureOut">
               <a:rPr lang="ko-KR" altLang="en-US" smtClean="0"/>
-              <a:t>2024-09-12</a:t>
+              <a:t>2024-09-13</a:t>
             </a:fld>
             <a:endParaRPr lang="ko-KR" altLang="en-US"/>
           </a:p>
@@ -3350,7 +3350,7 @@
           <a:p>
             <a:fld id="{E2943F92-62F6-46DA-9399-EAA06BCCF22F}" type="datetimeFigureOut">
               <a:rPr lang="ko-KR" altLang="en-US" smtClean="0"/>
-              <a:t>2024-09-12</a:t>
+              <a:t>2024-09-13</a:t>
             </a:fld>
             <a:endParaRPr lang="ko-KR" altLang="en-US"/>
           </a:p>
@@ -4270,7 +4270,7 @@
         </p:blipFill>
         <p:spPr>
           <a:xfrm>
-            <a:off x="8247862" y="3536650"/>
+            <a:off x="7964083" y="3423763"/>
             <a:ext cx="1433512" cy="795337"/>
           </a:xfrm>
           <a:prstGeom prst="rect">
@@ -4306,7 +4306,7 @@
         </p:blipFill>
         <p:spPr>
           <a:xfrm>
-            <a:off x="8418589" y="2276210"/>
+            <a:off x="8134810" y="2163323"/>
             <a:ext cx="1101452" cy="1101452"/>
           </a:xfrm>
           <a:prstGeom prst="rect">
@@ -4328,7 +4328,7 @@
         </p:nvSpPr>
         <p:spPr>
           <a:xfrm>
-            <a:off x="8753360" y="3103098"/>
+            <a:off x="8469581" y="2990211"/>
             <a:ext cx="422516" cy="466659"/>
           </a:xfrm>
           <a:prstGeom prst="mathPlus">
@@ -4394,7 +4394,7 @@
         </p:blipFill>
         <p:spPr>
           <a:xfrm>
-            <a:off x="4642526" y="1803575"/>
+            <a:off x="4358747" y="1690688"/>
             <a:ext cx="1885819" cy="1885819"/>
           </a:xfrm>
           <a:prstGeom prst="rect">
@@ -4418,7 +4418,7 @@
         </p:nvCxnSpPr>
         <p:spPr>
           <a:xfrm>
-            <a:off x="7296281" y="3428999"/>
+            <a:off x="7012502" y="3316112"/>
             <a:ext cx="971156" cy="0"/>
           </a:xfrm>
           <a:prstGeom prst="straightConnector1">
@@ -4461,7 +4461,7 @@
         </p:nvSpPr>
         <p:spPr>
           <a:xfrm>
-            <a:off x="8296111" y="2276210"/>
+            <a:off x="8012332" y="2163323"/>
             <a:ext cx="1317997" cy="2184430"/>
           </a:xfrm>
           <a:prstGeom prst="roundRect">
@@ -4513,7 +4513,7 @@
         </p:nvSpPr>
         <p:spPr>
           <a:xfrm>
-            <a:off x="4067503" y="1803575"/>
+            <a:off x="3783724" y="1690688"/>
             <a:ext cx="3184635" cy="4433253"/>
           </a:xfrm>
           <a:prstGeom prst="roundRect">
@@ -4579,7 +4579,7 @@
         </p:blipFill>
         <p:spPr>
           <a:xfrm>
-            <a:off x="4209071" y="4452357"/>
+            <a:off x="3925292" y="4339470"/>
             <a:ext cx="1376364" cy="1376364"/>
           </a:xfrm>
           <a:prstGeom prst="rect">
@@ -4615,7 +4615,7 @@
         </p:blipFill>
         <p:spPr>
           <a:xfrm>
-            <a:off x="4265893" y="5564778"/>
+            <a:off x="3982114" y="5451891"/>
             <a:ext cx="1461110" cy="430569"/>
           </a:xfrm>
           <a:prstGeom prst="rect">
@@ -4637,7 +4637,7 @@
         </p:nvSpPr>
         <p:spPr>
           <a:xfrm>
-            <a:off x="4149305" y="3773410"/>
+            <a:off x="3865526" y="3660523"/>
             <a:ext cx="1424814" cy="923330"/>
           </a:xfrm>
           <a:prstGeom prst="rect">
@@ -4702,7 +4702,7 @@
         </p:blipFill>
         <p:spPr>
           <a:xfrm>
-            <a:off x="5616516" y="4840668"/>
+            <a:off x="5332737" y="4727781"/>
             <a:ext cx="1438406" cy="384459"/>
           </a:xfrm>
           <a:prstGeom prst="rect">
@@ -4737,7 +4737,7 @@
         </p:blipFill>
         <p:spPr>
           <a:xfrm>
-            <a:off x="1455047" y="1991844"/>
+            <a:off x="1171268" y="1878957"/>
             <a:ext cx="963503" cy="2028357"/>
           </a:xfrm>
           <a:prstGeom prst="rect">
@@ -4759,7 +4759,7 @@
         </p:nvSpPr>
         <p:spPr>
           <a:xfrm>
-            <a:off x="614555" y="1803575"/>
+            <a:off x="330776" y="1690688"/>
             <a:ext cx="2644488" cy="4433253"/>
           </a:xfrm>
           <a:prstGeom prst="roundRect">
@@ -4811,7 +4811,7 @@
         </p:nvCxnSpPr>
         <p:spPr>
           <a:xfrm>
-            <a:off x="3310759" y="3428999"/>
+            <a:off x="3026980" y="3316112"/>
             <a:ext cx="699989" cy="0"/>
           </a:xfrm>
           <a:prstGeom prst="straightConnector1">
@@ -4854,7 +4854,7 @@
         </p:nvSpPr>
         <p:spPr>
           <a:xfrm>
-            <a:off x="650978" y="4331987"/>
+            <a:off x="367199" y="4219100"/>
             <a:ext cx="2694969" cy="830997"/>
           </a:xfrm>
           <a:prstGeom prst="rect">
@@ -4910,7 +4910,7 @@
         </p:nvSpPr>
         <p:spPr>
           <a:xfrm>
-            <a:off x="10329567" y="1803575"/>
+            <a:off x="10045788" y="1690688"/>
             <a:ext cx="1790963" cy="3947686"/>
           </a:xfrm>
           <a:prstGeom prst="roundRect">
@@ -4962,7 +4962,7 @@
         </p:nvCxnSpPr>
         <p:spPr>
           <a:xfrm>
-            <a:off x="9681374" y="3428999"/>
+            <a:off x="9397595" y="3316112"/>
             <a:ext cx="597743" cy="0"/>
           </a:xfrm>
           <a:prstGeom prst="straightConnector1">
@@ -5019,7 +5019,7 @@
         </p:blipFill>
         <p:spPr>
           <a:xfrm>
-            <a:off x="10581272" y="2017789"/>
+            <a:off x="10297493" y="1904902"/>
             <a:ext cx="1287551" cy="1287551"/>
           </a:xfrm>
           <a:prstGeom prst="rect">
@@ -5055,7 +5055,7 @@
         </p:blipFill>
         <p:spPr>
           <a:xfrm>
-            <a:off x="10685735" y="3103098"/>
+            <a:off x="10401956" y="2990211"/>
             <a:ext cx="1153592" cy="1153592"/>
           </a:xfrm>
           <a:prstGeom prst="rect">
@@ -5091,7 +5091,7 @@
         </p:blipFill>
         <p:spPr>
           <a:xfrm>
-            <a:off x="10767764" y="4390649"/>
+            <a:off x="10483985" y="4277762"/>
             <a:ext cx="1071563" cy="1071563"/>
           </a:xfrm>
           <a:prstGeom prst="rect">
@@ -5113,7 +5113,7 @@
         </p:nvSpPr>
         <p:spPr>
           <a:xfrm>
-            <a:off x="5798379" y="3733579"/>
+            <a:off x="5514600" y="3620692"/>
             <a:ext cx="1191032" cy="923330"/>
           </a:xfrm>
           <a:prstGeom prst="rect">
@@ -5178,7 +5178,7 @@
         </p:blipFill>
         <p:spPr>
           <a:xfrm>
-            <a:off x="5846946" y="5381156"/>
+            <a:off x="5563167" y="5268269"/>
             <a:ext cx="1191032" cy="626252"/>
           </a:xfrm>
           <a:prstGeom prst="rect">

</xml_diff>